<commit_message>
change collate and new version v0.2.9001
</commit_message>
<xml_diff>
--- a/inst/template.pptx
+++ b/inst/template.pptx
@@ -8,6 +8,8 @@
     <p:sldId id="256" r:id="rId2"/>
     <p:sldId id="257" r:id="rId3"/>
     <p:sldId id="258" r:id="rId4"/>
+    <p:sldId id="259" r:id="rId5"/>
+    <p:sldId id="260" r:id="rId6"/>
   </p:sldIdLst>
   <p:sldSz cx="9144000" cy="6858000" type="screen4x3"/>
   <p:notesSz cx="6858000" cy="9144000"/>
@@ -291,7 +293,7 @@
             <a:fld id="{9FADFB46-7370-4D89-8DEB-8C3272B5D011}" type="datetimeFigureOut">
               <a:rPr lang="de-DE" smtClean="0"/>
               <a:pPr/>
-              <a:t>02.09.2015</a:t>
+              <a:t>09.09.2015</a:t>
             </a:fld>
             <a:endParaRPr lang="de-DE"/>
           </a:p>
@@ -458,7 +460,7 @@
             <a:fld id="{9FADFB46-7370-4D89-8DEB-8C3272B5D011}" type="datetimeFigureOut">
               <a:rPr lang="de-DE" smtClean="0"/>
               <a:pPr/>
-              <a:t>02.09.2015</a:t>
+              <a:t>09.09.2015</a:t>
             </a:fld>
             <a:endParaRPr lang="de-DE"/>
           </a:p>
@@ -635,7 +637,7 @@
             <a:fld id="{9FADFB46-7370-4D89-8DEB-8C3272B5D011}" type="datetimeFigureOut">
               <a:rPr lang="de-DE" smtClean="0"/>
               <a:pPr/>
-              <a:t>02.09.2015</a:t>
+              <a:t>09.09.2015</a:t>
             </a:fld>
             <a:endParaRPr lang="de-DE"/>
           </a:p>
@@ -802,7 +804,7 @@
             <a:fld id="{9FADFB46-7370-4D89-8DEB-8C3272B5D011}" type="datetimeFigureOut">
               <a:rPr lang="de-DE" smtClean="0"/>
               <a:pPr/>
-              <a:t>02.09.2015</a:t>
+              <a:t>09.09.2015</a:t>
             </a:fld>
             <a:endParaRPr lang="de-DE"/>
           </a:p>
@@ -1045,7 +1047,7 @@
             <a:fld id="{9FADFB46-7370-4D89-8DEB-8C3272B5D011}" type="datetimeFigureOut">
               <a:rPr lang="de-DE" smtClean="0"/>
               <a:pPr/>
-              <a:t>02.09.2015</a:t>
+              <a:t>09.09.2015</a:t>
             </a:fld>
             <a:endParaRPr lang="de-DE"/>
           </a:p>
@@ -1330,7 +1332,7 @@
             <a:fld id="{9FADFB46-7370-4D89-8DEB-8C3272B5D011}" type="datetimeFigureOut">
               <a:rPr lang="de-DE" smtClean="0"/>
               <a:pPr/>
-              <a:t>02.09.2015</a:t>
+              <a:t>09.09.2015</a:t>
             </a:fld>
             <a:endParaRPr lang="de-DE"/>
           </a:p>
@@ -1749,7 +1751,7 @@
             <a:fld id="{9FADFB46-7370-4D89-8DEB-8C3272B5D011}" type="datetimeFigureOut">
               <a:rPr lang="de-DE" smtClean="0"/>
               <a:pPr/>
-              <a:t>02.09.2015</a:t>
+              <a:t>09.09.2015</a:t>
             </a:fld>
             <a:endParaRPr lang="de-DE"/>
           </a:p>
@@ -1864,7 +1866,7 @@
             <a:fld id="{9FADFB46-7370-4D89-8DEB-8C3272B5D011}" type="datetimeFigureOut">
               <a:rPr lang="de-DE" smtClean="0"/>
               <a:pPr/>
-              <a:t>02.09.2015</a:t>
+              <a:t>09.09.2015</a:t>
             </a:fld>
             <a:endParaRPr lang="de-DE"/>
           </a:p>
@@ -1956,7 +1958,7 @@
             <a:fld id="{9FADFB46-7370-4D89-8DEB-8C3272B5D011}" type="datetimeFigureOut">
               <a:rPr lang="de-DE" smtClean="0"/>
               <a:pPr/>
-              <a:t>02.09.2015</a:t>
+              <a:t>09.09.2015</a:t>
             </a:fld>
             <a:endParaRPr lang="de-DE"/>
           </a:p>
@@ -2230,7 +2232,7 @@
             <a:fld id="{9FADFB46-7370-4D89-8DEB-8C3272B5D011}" type="datetimeFigureOut">
               <a:rPr lang="de-DE" smtClean="0"/>
               <a:pPr/>
-              <a:t>02.09.2015</a:t>
+              <a:t>09.09.2015</a:t>
             </a:fld>
             <a:endParaRPr lang="de-DE"/>
           </a:p>
@@ -2480,7 +2482,7 @@
             <a:fld id="{9FADFB46-7370-4D89-8DEB-8C3272B5D011}" type="datetimeFigureOut">
               <a:rPr lang="de-DE" smtClean="0"/>
               <a:pPr/>
-              <a:t>02.09.2015</a:t>
+              <a:t>09.09.2015</a:t>
             </a:fld>
             <a:endParaRPr lang="de-DE"/>
           </a:p>
@@ -2690,7 +2692,7 @@
             <a:fld id="{9FADFB46-7370-4D89-8DEB-8C3272B5D011}" type="datetimeFigureOut">
               <a:rPr lang="de-DE" smtClean="0"/>
               <a:pPr/>
-              <a:t>02.09.2015</a:t>
+              <a:t>09.09.2015</a:t>
             </a:fld>
             <a:endParaRPr lang="de-DE"/>
           </a:p>
@@ -3145,11 +3147,7 @@
             </a:r>
             <a:r>
               <a:rPr lang="de-DE" smtClean="0"/>
-              <a:t>tag </a:t>
-            </a:r>
-            <a:r>
-              <a:rPr lang="de-DE" smtClean="0"/>
-              <a:t>2]]</a:t>
+              <a:t>tag 2]]</a:t>
             </a:r>
             <a:endParaRPr lang="de-DE" dirty="0" smtClean="0"/>
           </a:p>
@@ -3210,6 +3208,189 @@
             <a:r>
               <a:rPr lang="de-DE" smtClean="0"/>
               <a:t>tag 2]]</a:t>
+            </a:r>
+            <a:endParaRPr lang="de-DE" dirty="0" smtClean="0"/>
+          </a:p>
+        </p:txBody>
+      </p:sp>
+    </p:spTree>
+  </p:cSld>
+  <p:clrMapOvr>
+    <a:masterClrMapping/>
+  </p:clrMapOvr>
+</p:sld>
+</file>
+
+<file path=ppt/slides/slide4.xml><?xml version="1.0" encoding="utf-8"?>
+<p:sld xmlns:a="http://schemas.openxmlformats.org/drawingml/2006/main" xmlns:r="http://schemas.openxmlformats.org/officeDocument/2006/relationships" xmlns:p="http://schemas.openxmlformats.org/presentationml/2006/main">
+  <p:cSld>
+    <p:spTree>
+      <p:nvGrpSpPr>
+        <p:cNvPr id="1" name=""/>
+        <p:cNvGrpSpPr/>
+        <p:nvPr/>
+      </p:nvGrpSpPr>
+      <p:grpSpPr>
+        <a:xfrm>
+          <a:off x="0" y="0"/>
+          <a:ext cx="0" cy="0"/>
+          <a:chOff x="0" y="0"/>
+          <a:chExt cx="0" cy="0"/>
+        </a:xfrm>
+      </p:grpSpPr>
+      <p:sp>
+        <p:nvSpPr>
+          <p:cNvPr id="3" name="Rechteck 2"/>
+          <p:cNvSpPr/>
+          <p:nvPr/>
+        </p:nvSpPr>
+        <p:spPr>
+          <a:xfrm>
+            <a:off x="1403648" y="1268760"/>
+            <a:ext cx="6192688" cy="4176464"/>
+          </a:xfrm>
+          <a:prstGeom prst="rect">
+            <a:avLst/>
+          </a:prstGeom>
+        </p:spPr>
+        <p:style>
+          <a:lnRef idx="2">
+            <a:schemeClr val="dk1"/>
+          </a:lnRef>
+          <a:fillRef idx="1">
+            <a:schemeClr val="lt1"/>
+          </a:fillRef>
+          <a:effectRef idx="0">
+            <a:schemeClr val="dk1"/>
+          </a:effectRef>
+          <a:fontRef idx="minor">
+            <a:schemeClr val="dk1"/>
+          </a:fontRef>
+        </p:style>
+        <p:txBody>
+          <a:bodyPr rtlCol="0" anchor="ctr"/>
+          <a:lstStyle/>
+          <a:p>
+            <a:pPr algn="ctr"/>
+            <a:r>
+              <a:rPr lang="de-DE" dirty="0" smtClean="0"/>
+              <a:t>[[tag 1]]</a:t>
+            </a:r>
+          </a:p>
+        </p:txBody>
+      </p:sp>
+    </p:spTree>
+  </p:cSld>
+  <p:clrMapOvr>
+    <a:masterClrMapping/>
+  </p:clrMapOvr>
+</p:sld>
+</file>
+
+<file path=ppt/slides/slide5.xml><?xml version="1.0" encoding="utf-8"?>
+<p:sld xmlns:a="http://schemas.openxmlformats.org/drawingml/2006/main" xmlns:r="http://schemas.openxmlformats.org/officeDocument/2006/relationships" xmlns:p="http://schemas.openxmlformats.org/presentationml/2006/main">
+  <p:cSld>
+    <p:spTree>
+      <p:nvGrpSpPr>
+        <p:cNvPr id="1" name=""/>
+        <p:cNvGrpSpPr/>
+        <p:nvPr/>
+      </p:nvGrpSpPr>
+      <p:grpSpPr>
+        <a:xfrm>
+          <a:off x="0" y="0"/>
+          <a:ext cx="0" cy="0"/>
+          <a:chOff x="0" y="0"/>
+          <a:chExt cx="0" cy="0"/>
+        </a:xfrm>
+      </p:grpSpPr>
+      <p:sp>
+        <p:nvSpPr>
+          <p:cNvPr id="3" name="Rechteck 2"/>
+          <p:cNvSpPr/>
+          <p:nvPr/>
+        </p:nvSpPr>
+        <p:spPr>
+          <a:xfrm>
+            <a:off x="611560" y="836712"/>
+            <a:ext cx="3456384" cy="5112568"/>
+          </a:xfrm>
+          <a:prstGeom prst="rect">
+            <a:avLst/>
+          </a:prstGeom>
+        </p:spPr>
+        <p:style>
+          <a:lnRef idx="2">
+            <a:schemeClr val="dk1"/>
+          </a:lnRef>
+          <a:fillRef idx="1">
+            <a:schemeClr val="lt1"/>
+          </a:fillRef>
+          <a:effectRef idx="0">
+            <a:schemeClr val="dk1"/>
+          </a:effectRef>
+          <a:fontRef idx="minor">
+            <a:schemeClr val="dk1"/>
+          </a:fontRef>
+        </p:style>
+        <p:txBody>
+          <a:bodyPr rtlCol="0" anchor="ctr"/>
+          <a:lstStyle/>
+          <a:p>
+            <a:pPr algn="ctr"/>
+            <a:r>
+              <a:rPr lang="de-DE" dirty="0" smtClean="0"/>
+              <a:t>[[tag 2</a:t>
+            </a:r>
+            <a:r>
+              <a:rPr lang="de-DE" dirty="0" smtClean="0"/>
+              <a:t>]]</a:t>
+            </a:r>
+            <a:endParaRPr lang="de-DE" dirty="0" smtClean="0"/>
+          </a:p>
+        </p:txBody>
+      </p:sp>
+      <p:sp>
+        <p:nvSpPr>
+          <p:cNvPr id="4" name="Rechteck 3"/>
+          <p:cNvSpPr/>
+          <p:nvPr/>
+        </p:nvSpPr>
+        <p:spPr>
+          <a:xfrm>
+            <a:off x="4860032" y="836712"/>
+            <a:ext cx="3456384" cy="5112568"/>
+          </a:xfrm>
+          <a:prstGeom prst="rect">
+            <a:avLst/>
+          </a:prstGeom>
+        </p:spPr>
+        <p:style>
+          <a:lnRef idx="2">
+            <a:schemeClr val="dk1"/>
+          </a:lnRef>
+          <a:fillRef idx="1">
+            <a:schemeClr val="lt1"/>
+          </a:fillRef>
+          <a:effectRef idx="0">
+            <a:schemeClr val="dk1"/>
+          </a:effectRef>
+          <a:fontRef idx="minor">
+            <a:schemeClr val="dk1"/>
+          </a:fontRef>
+        </p:style>
+        <p:txBody>
+          <a:bodyPr rtlCol="0" anchor="ctr"/>
+          <a:lstStyle/>
+          <a:p>
+            <a:pPr algn="ctr"/>
+            <a:r>
+              <a:rPr lang="de-DE" dirty="0" smtClean="0"/>
+              <a:t>[[tag 2</a:t>
+            </a:r>
+            <a:r>
+              <a:rPr lang="de-DE" dirty="0" smtClean="0"/>
+              <a:t>]]</a:t>
             </a:r>
             <a:endParaRPr lang="de-DE" dirty="0" smtClean="0"/>
           </a:p>

</xml_diff>

<commit_message>
add z-order argument to several functions(close #1)
* Updated docs and twekaed DESCRIPTION (UTF8, no staged installation)
* Add `z.order` argument to `PPT.AddGraphicstoSlide2`, tweaked
  examples and sample PPTX to show feature
* Add `MsoZOrderCmd` enumeration
</commit_message>
<xml_diff>
--- a/inst/template.pptx
+++ b/inst/template.pptx
@@ -306,7 +306,7 @@
             <a:fld id="{9FADFB46-7370-4D89-8DEB-8C3272B5D011}" type="datetimeFigureOut">
               <a:rPr lang="de-DE" smtClean="0"/>
               <a:pPr/>
-              <a:t>02.07.2018</a:t>
+              <a:t>15.04.2022</a:t>
             </a:fld>
             <a:endParaRPr lang="de-DE"/>
           </a:p>
@@ -471,7 +471,7 @@
             <a:fld id="{9FADFB46-7370-4D89-8DEB-8C3272B5D011}" type="datetimeFigureOut">
               <a:rPr lang="de-DE" smtClean="0"/>
               <a:pPr/>
-              <a:t>02.07.2018</a:t>
+              <a:t>15.04.2022</a:t>
             </a:fld>
             <a:endParaRPr lang="de-DE"/>
           </a:p>
@@ -646,7 +646,7 @@
             <a:fld id="{9FADFB46-7370-4D89-8DEB-8C3272B5D011}" type="datetimeFigureOut">
               <a:rPr lang="de-DE" smtClean="0"/>
               <a:pPr/>
-              <a:t>02.07.2018</a:t>
+              <a:t>15.04.2022</a:t>
             </a:fld>
             <a:endParaRPr lang="de-DE"/>
           </a:p>
@@ -811,7 +811,7 @@
             <a:fld id="{9FADFB46-7370-4D89-8DEB-8C3272B5D011}" type="datetimeFigureOut">
               <a:rPr lang="de-DE" smtClean="0"/>
               <a:pPr/>
-              <a:t>02.07.2018</a:t>
+              <a:t>15.04.2022</a:t>
             </a:fld>
             <a:endParaRPr lang="de-DE"/>
           </a:p>
@@ -1053,7 +1053,7 @@
             <a:fld id="{9FADFB46-7370-4D89-8DEB-8C3272B5D011}" type="datetimeFigureOut">
               <a:rPr lang="de-DE" smtClean="0"/>
               <a:pPr/>
-              <a:t>02.07.2018</a:t>
+              <a:t>15.04.2022</a:t>
             </a:fld>
             <a:endParaRPr lang="de-DE"/>
           </a:p>
@@ -1335,7 +1335,7 @@
             <a:fld id="{9FADFB46-7370-4D89-8DEB-8C3272B5D011}" type="datetimeFigureOut">
               <a:rPr lang="de-DE" smtClean="0"/>
               <a:pPr/>
-              <a:t>02.07.2018</a:t>
+              <a:t>15.04.2022</a:t>
             </a:fld>
             <a:endParaRPr lang="de-DE"/>
           </a:p>
@@ -1751,7 +1751,7 @@
             <a:fld id="{9FADFB46-7370-4D89-8DEB-8C3272B5D011}" type="datetimeFigureOut">
               <a:rPr lang="de-DE" smtClean="0"/>
               <a:pPr/>
-              <a:t>02.07.2018</a:t>
+              <a:t>15.04.2022</a:t>
             </a:fld>
             <a:endParaRPr lang="de-DE"/>
           </a:p>
@@ -1865,7 +1865,7 @@
             <a:fld id="{9FADFB46-7370-4D89-8DEB-8C3272B5D011}" type="datetimeFigureOut">
               <a:rPr lang="de-DE" smtClean="0"/>
               <a:pPr/>
-              <a:t>02.07.2018</a:t>
+              <a:t>15.04.2022</a:t>
             </a:fld>
             <a:endParaRPr lang="de-DE"/>
           </a:p>
@@ -1957,7 +1957,7 @@
             <a:fld id="{9FADFB46-7370-4D89-8DEB-8C3272B5D011}" type="datetimeFigureOut">
               <a:rPr lang="de-DE" smtClean="0"/>
               <a:pPr/>
-              <a:t>02.07.2018</a:t>
+              <a:t>15.04.2022</a:t>
             </a:fld>
             <a:endParaRPr lang="de-DE"/>
           </a:p>
@@ -2229,7 +2229,7 @@
             <a:fld id="{9FADFB46-7370-4D89-8DEB-8C3272B5D011}" type="datetimeFigureOut">
               <a:rPr lang="de-DE" smtClean="0"/>
               <a:pPr/>
-              <a:t>02.07.2018</a:t>
+              <a:t>15.04.2022</a:t>
             </a:fld>
             <a:endParaRPr lang="de-DE"/>
           </a:p>
@@ -2478,7 +2478,7 @@
             <a:fld id="{9FADFB46-7370-4D89-8DEB-8C3272B5D011}" type="datetimeFigureOut">
               <a:rPr lang="de-DE" smtClean="0"/>
               <a:pPr/>
-              <a:t>02.07.2018</a:t>
+              <a:t>15.04.2022</a:t>
             </a:fld>
             <a:endParaRPr lang="de-DE"/>
           </a:p>
@@ -2686,7 +2686,7 @@
             <a:fld id="{9FADFB46-7370-4D89-8DEB-8C3272B5D011}" type="datetimeFigureOut">
               <a:rPr lang="de-DE" smtClean="0"/>
               <a:pPr/>
-              <a:t>02.07.2018</a:t>
+              <a:t>15.04.2022</a:t>
             </a:fld>
             <a:endParaRPr lang="de-DE"/>
           </a:p>
@@ -3357,6 +3357,71 @@
             <a:r>
               <a:rPr lang="de-DE" dirty="0"/>
               <a:t>[[tag 2]]</a:t>
+            </a:r>
+          </a:p>
+        </p:txBody>
+      </p:sp>
+      <p:sp>
+        <p:nvSpPr>
+          <p:cNvPr id="2" name="Rechteck: abgerundete Ecken 1">
+            <a:extLst>
+              <a:ext uri="{FF2B5EF4-FFF2-40B4-BE49-F238E27FC236}">
+                <a16:creationId xmlns:a16="http://schemas.microsoft.com/office/drawing/2014/main" id="{4198BCD5-EEF4-4B64-887C-7DEB10D5AB70}"/>
+              </a:ext>
+            </a:extLst>
+          </p:cNvPr>
+          <p:cNvSpPr/>
+          <p:nvPr/>
+        </p:nvSpPr>
+        <p:spPr>
+          <a:xfrm>
+            <a:off x="6804248" y="152636"/>
+            <a:ext cx="2160240" cy="1080122"/>
+          </a:xfrm>
+          <a:prstGeom prst="roundRect">
+            <a:avLst/>
+          </a:prstGeom>
+        </p:spPr>
+        <p:style>
+          <a:lnRef idx="2">
+            <a:schemeClr val="accent1">
+              <a:shade val="50000"/>
+            </a:schemeClr>
+          </a:lnRef>
+          <a:fillRef idx="1">
+            <a:schemeClr val="accent1"/>
+          </a:fillRef>
+          <a:effectRef idx="0">
+            <a:schemeClr val="accent1"/>
+          </a:effectRef>
+          <a:fontRef idx="minor">
+            <a:schemeClr val="lt1"/>
+          </a:fontRef>
+        </p:style>
+        <p:txBody>
+          <a:bodyPr rtlCol="0" anchor="ctr"/>
+          <a:lstStyle/>
+          <a:p>
+            <a:pPr algn="ctr"/>
+            <a:r>
+              <a:rPr lang="de-DE" dirty="0"/>
+              <a:t>Some </a:t>
+            </a:r>
+            <a:r>
+              <a:rPr lang="de-DE" dirty="0" err="1"/>
+              <a:t>comment</a:t>
+            </a:r>
+            <a:r>
+              <a:rPr lang="de-DE" dirty="0"/>
+              <a:t> which should </a:t>
+            </a:r>
+            <a:r>
+              <a:rPr lang="de-DE" dirty="0" err="1"/>
+              <a:t>stay</a:t>
+            </a:r>
+            <a:r>
+              <a:rPr lang="de-DE" dirty="0"/>
+              <a:t> on top </a:t>
             </a:r>
           </a:p>
         </p:txBody>

</xml_diff>